<commit_message>
added tableau steps in the power point
</commit_message>
<xml_diff>
--- a/Video_PPT.pptx
+++ b/Video_PPT.pptx
@@ -8,6 +8,7 @@
     <p:sldId id="256" r:id="rId2"/>
     <p:sldId id="257" r:id="rId3"/>
     <p:sldId id="258" r:id="rId4"/>
+    <p:sldId id="259" r:id="rId5"/>
   </p:sldIdLst>
   <p:sldSz cx="12192000" cy="6858000"/>
   <p:notesSz cx="6858000" cy="9144000"/>
@@ -156,10 +157,9 @@
           </a:lstStyle>
           <a:p>
             <a:r>
-              <a:rPr lang="en-US" smtClean="0"/>
+              <a:rPr lang="en-US"/>
               <a:t>Click to edit Master title style</a:t>
             </a:r>
-            <a:endParaRPr lang="en-US"/>
           </a:p>
         </p:txBody>
       </p:sp>
@@ -221,10 +221,9 @@
           </a:lstStyle>
           <a:p>
             <a:r>
-              <a:rPr lang="en-US" smtClean="0"/>
+              <a:rPr lang="en-US"/>
               <a:t>Click to edit Master subtitle style</a:t>
             </a:r>
-            <a:endParaRPr lang="en-US"/>
           </a:p>
         </p:txBody>
       </p:sp>
@@ -339,10 +338,9 @@
           <a:lstStyle/>
           <a:p>
             <a:r>
-              <a:rPr lang="en-US" smtClean="0"/>
+              <a:rPr lang="en-US"/>
               <a:t>Click to edit Master title style</a:t>
             </a:r>
-            <a:endParaRPr lang="en-US"/>
           </a:p>
         </p:txBody>
       </p:sp>
@@ -363,38 +361,37 @@
           <a:p>
             <a:pPr lvl="0"/>
             <a:r>
-              <a:rPr lang="en-US" smtClean="0"/>
+              <a:rPr lang="en-US"/>
               <a:t>Edit Master text styles</a:t>
             </a:r>
           </a:p>
           <a:p>
             <a:pPr lvl="1"/>
             <a:r>
-              <a:rPr lang="en-US" smtClean="0"/>
+              <a:rPr lang="en-US"/>
               <a:t>Second level</a:t>
             </a:r>
           </a:p>
           <a:p>
             <a:pPr lvl="2"/>
             <a:r>
-              <a:rPr lang="en-US" smtClean="0"/>
+              <a:rPr lang="en-US"/>
               <a:t>Third level</a:t>
             </a:r>
           </a:p>
           <a:p>
             <a:pPr lvl="3"/>
             <a:r>
-              <a:rPr lang="en-US" smtClean="0"/>
+              <a:rPr lang="en-US"/>
               <a:t>Fourth level</a:t>
             </a:r>
           </a:p>
           <a:p>
             <a:pPr lvl="4"/>
             <a:r>
-              <a:rPr lang="en-US" smtClean="0"/>
+              <a:rPr lang="en-US"/>
               <a:t>Fifth level</a:t>
             </a:r>
-            <a:endParaRPr lang="en-US"/>
           </a:p>
         </p:txBody>
       </p:sp>
@@ -514,10 +511,9 @@
           <a:lstStyle/>
           <a:p>
             <a:r>
-              <a:rPr lang="en-US" smtClean="0"/>
+              <a:rPr lang="en-US"/>
               <a:t>Click to edit Master title style</a:t>
             </a:r>
-            <a:endParaRPr lang="en-US"/>
           </a:p>
         </p:txBody>
       </p:sp>
@@ -543,38 +539,37 @@
           <a:p>
             <a:pPr lvl="0"/>
             <a:r>
-              <a:rPr lang="en-US" smtClean="0"/>
+              <a:rPr lang="en-US"/>
               <a:t>Edit Master text styles</a:t>
             </a:r>
           </a:p>
           <a:p>
             <a:pPr lvl="1"/>
             <a:r>
-              <a:rPr lang="en-US" smtClean="0"/>
+              <a:rPr lang="en-US"/>
               <a:t>Second level</a:t>
             </a:r>
           </a:p>
           <a:p>
             <a:pPr lvl="2"/>
             <a:r>
-              <a:rPr lang="en-US" smtClean="0"/>
+              <a:rPr lang="en-US"/>
               <a:t>Third level</a:t>
             </a:r>
           </a:p>
           <a:p>
             <a:pPr lvl="3"/>
             <a:r>
-              <a:rPr lang="en-US" smtClean="0"/>
+              <a:rPr lang="en-US"/>
               <a:t>Fourth level</a:t>
             </a:r>
           </a:p>
           <a:p>
             <a:pPr lvl="4"/>
             <a:r>
-              <a:rPr lang="en-US" smtClean="0"/>
+              <a:rPr lang="en-US"/>
               <a:t>Fifth level</a:t>
             </a:r>
-            <a:endParaRPr lang="en-US"/>
           </a:p>
         </p:txBody>
       </p:sp>
@@ -689,10 +684,9 @@
           <a:lstStyle/>
           <a:p>
             <a:r>
-              <a:rPr lang="en-US" smtClean="0"/>
+              <a:rPr lang="en-US"/>
               <a:t>Click to edit Master title style</a:t>
             </a:r>
-            <a:endParaRPr lang="en-US"/>
           </a:p>
         </p:txBody>
       </p:sp>
@@ -713,38 +707,37 @@
           <a:p>
             <a:pPr lvl="0"/>
             <a:r>
-              <a:rPr lang="en-US" smtClean="0"/>
+              <a:rPr lang="en-US"/>
               <a:t>Edit Master text styles</a:t>
             </a:r>
           </a:p>
           <a:p>
             <a:pPr lvl="1"/>
             <a:r>
-              <a:rPr lang="en-US" smtClean="0"/>
+              <a:rPr lang="en-US"/>
               <a:t>Second level</a:t>
             </a:r>
           </a:p>
           <a:p>
             <a:pPr lvl="2"/>
             <a:r>
-              <a:rPr lang="en-US" smtClean="0"/>
+              <a:rPr lang="en-US"/>
               <a:t>Third level</a:t>
             </a:r>
           </a:p>
           <a:p>
             <a:pPr lvl="3"/>
             <a:r>
-              <a:rPr lang="en-US" smtClean="0"/>
+              <a:rPr lang="en-US"/>
               <a:t>Fourth level</a:t>
             </a:r>
           </a:p>
           <a:p>
             <a:pPr lvl="4"/>
             <a:r>
-              <a:rPr lang="en-US" smtClean="0"/>
+              <a:rPr lang="en-US"/>
               <a:t>Fifth level</a:t>
             </a:r>
-            <a:endParaRPr lang="en-US"/>
           </a:p>
         </p:txBody>
       </p:sp>
@@ -868,10 +861,9 @@
           </a:lstStyle>
           <a:p>
             <a:r>
-              <a:rPr lang="en-US" smtClean="0"/>
+              <a:rPr lang="en-US"/>
               <a:t>Click to edit Master title style</a:t>
             </a:r>
-            <a:endParaRPr lang="en-US"/>
           </a:p>
         </p:txBody>
       </p:sp>
@@ -988,7 +980,7 @@
           <a:p>
             <a:pPr lvl="0"/>
             <a:r>
-              <a:rPr lang="en-US" smtClean="0"/>
+              <a:rPr lang="en-US"/>
               <a:t>Edit Master text styles</a:t>
             </a:r>
           </a:p>
@@ -1105,10 +1097,9 @@
           <a:lstStyle/>
           <a:p>
             <a:r>
-              <a:rPr lang="en-US" smtClean="0"/>
+              <a:rPr lang="en-US"/>
               <a:t>Click to edit Master title style</a:t>
             </a:r>
-            <a:endParaRPr lang="en-US"/>
           </a:p>
         </p:txBody>
       </p:sp>
@@ -1134,38 +1125,37 @@
           <a:p>
             <a:pPr lvl="0"/>
             <a:r>
-              <a:rPr lang="en-US" smtClean="0"/>
+              <a:rPr lang="en-US"/>
               <a:t>Edit Master text styles</a:t>
             </a:r>
           </a:p>
           <a:p>
             <a:pPr lvl="1"/>
             <a:r>
-              <a:rPr lang="en-US" smtClean="0"/>
+              <a:rPr lang="en-US"/>
               <a:t>Second level</a:t>
             </a:r>
           </a:p>
           <a:p>
             <a:pPr lvl="2"/>
             <a:r>
-              <a:rPr lang="en-US" smtClean="0"/>
+              <a:rPr lang="en-US"/>
               <a:t>Third level</a:t>
             </a:r>
           </a:p>
           <a:p>
             <a:pPr lvl="3"/>
             <a:r>
-              <a:rPr lang="en-US" smtClean="0"/>
+              <a:rPr lang="en-US"/>
               <a:t>Fourth level</a:t>
             </a:r>
           </a:p>
           <a:p>
             <a:pPr lvl="4"/>
             <a:r>
-              <a:rPr lang="en-US" smtClean="0"/>
+              <a:rPr lang="en-US"/>
               <a:t>Fifth level</a:t>
             </a:r>
-            <a:endParaRPr lang="en-US"/>
           </a:p>
         </p:txBody>
       </p:sp>
@@ -1191,38 +1181,37 @@
           <a:p>
             <a:pPr lvl="0"/>
             <a:r>
-              <a:rPr lang="en-US" smtClean="0"/>
+              <a:rPr lang="en-US"/>
               <a:t>Edit Master text styles</a:t>
             </a:r>
           </a:p>
           <a:p>
             <a:pPr lvl="1"/>
             <a:r>
-              <a:rPr lang="en-US" smtClean="0"/>
+              <a:rPr lang="en-US"/>
               <a:t>Second level</a:t>
             </a:r>
           </a:p>
           <a:p>
             <a:pPr lvl="2"/>
             <a:r>
-              <a:rPr lang="en-US" smtClean="0"/>
+              <a:rPr lang="en-US"/>
               <a:t>Third level</a:t>
             </a:r>
           </a:p>
           <a:p>
             <a:pPr lvl="3"/>
             <a:r>
-              <a:rPr lang="en-US" smtClean="0"/>
+              <a:rPr lang="en-US"/>
               <a:t>Fourth level</a:t>
             </a:r>
           </a:p>
           <a:p>
             <a:pPr lvl="4"/>
             <a:r>
-              <a:rPr lang="en-US" smtClean="0"/>
+              <a:rPr lang="en-US"/>
               <a:t>Fifth level</a:t>
             </a:r>
-            <a:endParaRPr lang="en-US"/>
           </a:p>
         </p:txBody>
       </p:sp>
@@ -1342,10 +1331,9 @@
           <a:lstStyle/>
           <a:p>
             <a:r>
-              <a:rPr lang="en-US" smtClean="0"/>
+              <a:rPr lang="en-US"/>
               <a:t>Click to edit Master title style</a:t>
             </a:r>
-            <a:endParaRPr lang="en-US"/>
           </a:p>
         </p:txBody>
       </p:sp>
@@ -1408,7 +1396,7 @@
           <a:p>
             <a:pPr lvl="0"/>
             <a:r>
-              <a:rPr lang="en-US" smtClean="0"/>
+              <a:rPr lang="en-US"/>
               <a:t>Edit Master text styles</a:t>
             </a:r>
           </a:p>
@@ -1436,38 +1424,37 @@
           <a:p>
             <a:pPr lvl="0"/>
             <a:r>
-              <a:rPr lang="en-US" smtClean="0"/>
+              <a:rPr lang="en-US"/>
               <a:t>Edit Master text styles</a:t>
             </a:r>
           </a:p>
           <a:p>
             <a:pPr lvl="1"/>
             <a:r>
-              <a:rPr lang="en-US" smtClean="0"/>
+              <a:rPr lang="en-US"/>
               <a:t>Second level</a:t>
             </a:r>
           </a:p>
           <a:p>
             <a:pPr lvl="2"/>
             <a:r>
-              <a:rPr lang="en-US" smtClean="0"/>
+              <a:rPr lang="en-US"/>
               <a:t>Third level</a:t>
             </a:r>
           </a:p>
           <a:p>
             <a:pPr lvl="3"/>
             <a:r>
-              <a:rPr lang="en-US" smtClean="0"/>
+              <a:rPr lang="en-US"/>
               <a:t>Fourth level</a:t>
             </a:r>
           </a:p>
           <a:p>
             <a:pPr lvl="4"/>
             <a:r>
-              <a:rPr lang="en-US" smtClean="0"/>
+              <a:rPr lang="en-US"/>
               <a:t>Fifth level</a:t>
             </a:r>
-            <a:endParaRPr lang="en-US"/>
           </a:p>
         </p:txBody>
       </p:sp>
@@ -1530,7 +1517,7 @@
           <a:p>
             <a:pPr lvl="0"/>
             <a:r>
-              <a:rPr lang="en-US" smtClean="0"/>
+              <a:rPr lang="en-US"/>
               <a:t>Edit Master text styles</a:t>
             </a:r>
           </a:p>
@@ -1558,38 +1545,37 @@
           <a:p>
             <a:pPr lvl="0"/>
             <a:r>
-              <a:rPr lang="en-US" smtClean="0"/>
+              <a:rPr lang="en-US"/>
               <a:t>Edit Master text styles</a:t>
             </a:r>
           </a:p>
           <a:p>
             <a:pPr lvl="1"/>
             <a:r>
-              <a:rPr lang="en-US" smtClean="0"/>
+              <a:rPr lang="en-US"/>
               <a:t>Second level</a:t>
             </a:r>
           </a:p>
           <a:p>
             <a:pPr lvl="2"/>
             <a:r>
-              <a:rPr lang="en-US" smtClean="0"/>
+              <a:rPr lang="en-US"/>
               <a:t>Third level</a:t>
             </a:r>
           </a:p>
           <a:p>
             <a:pPr lvl="3"/>
             <a:r>
-              <a:rPr lang="en-US" smtClean="0"/>
+              <a:rPr lang="en-US"/>
               <a:t>Fourth level</a:t>
             </a:r>
           </a:p>
           <a:p>
             <a:pPr lvl="4"/>
             <a:r>
-              <a:rPr lang="en-US" smtClean="0"/>
+              <a:rPr lang="en-US"/>
               <a:t>Fifth level</a:t>
             </a:r>
-            <a:endParaRPr lang="en-US"/>
           </a:p>
         </p:txBody>
       </p:sp>
@@ -1704,10 +1690,9 @@
           <a:lstStyle/>
           <a:p>
             <a:r>
-              <a:rPr lang="en-US" smtClean="0"/>
+              <a:rPr lang="en-US"/>
               <a:t>Click to edit Master title style</a:t>
             </a:r>
-            <a:endParaRPr lang="en-US"/>
           </a:p>
         </p:txBody>
       </p:sp>
@@ -1926,10 +1911,9 @@
           </a:lstStyle>
           <a:p>
             <a:r>
-              <a:rPr lang="en-US" smtClean="0"/>
+              <a:rPr lang="en-US"/>
               <a:t>Click to edit Master title style</a:t>
             </a:r>
-            <a:endParaRPr lang="en-US"/>
           </a:p>
         </p:txBody>
       </p:sp>
@@ -1983,38 +1967,37 @@
           <a:p>
             <a:pPr lvl="0"/>
             <a:r>
-              <a:rPr lang="en-US" smtClean="0"/>
+              <a:rPr lang="en-US"/>
               <a:t>Edit Master text styles</a:t>
             </a:r>
           </a:p>
           <a:p>
             <a:pPr lvl="1"/>
             <a:r>
-              <a:rPr lang="en-US" smtClean="0"/>
+              <a:rPr lang="en-US"/>
               <a:t>Second level</a:t>
             </a:r>
           </a:p>
           <a:p>
             <a:pPr lvl="2"/>
             <a:r>
-              <a:rPr lang="en-US" smtClean="0"/>
+              <a:rPr lang="en-US"/>
               <a:t>Third level</a:t>
             </a:r>
           </a:p>
           <a:p>
             <a:pPr lvl="3"/>
             <a:r>
-              <a:rPr lang="en-US" smtClean="0"/>
+              <a:rPr lang="en-US"/>
               <a:t>Fourth level</a:t>
             </a:r>
           </a:p>
           <a:p>
             <a:pPr lvl="4"/>
             <a:r>
-              <a:rPr lang="en-US" smtClean="0"/>
+              <a:rPr lang="en-US"/>
               <a:t>Fifth level</a:t>
             </a:r>
-            <a:endParaRPr lang="en-US"/>
           </a:p>
         </p:txBody>
       </p:sp>
@@ -2077,7 +2060,7 @@
           <a:p>
             <a:pPr lvl="0"/>
             <a:r>
-              <a:rPr lang="en-US" smtClean="0"/>
+              <a:rPr lang="en-US"/>
               <a:t>Edit Master text styles</a:t>
             </a:r>
           </a:p>
@@ -2203,10 +2186,9 @@
           </a:lstStyle>
           <a:p>
             <a:r>
-              <a:rPr lang="en-US" smtClean="0"/>
+              <a:rPr lang="en-US"/>
               <a:t>Click to edit Master title style</a:t>
             </a:r>
-            <a:endParaRPr lang="en-US"/>
           </a:p>
         </p:txBody>
       </p:sp>
@@ -2330,7 +2312,7 @@
           <a:p>
             <a:pPr lvl="0"/>
             <a:r>
-              <a:rPr lang="en-US" smtClean="0"/>
+              <a:rPr lang="en-US"/>
               <a:t>Edit Master text styles</a:t>
             </a:r>
           </a:p>
@@ -2462,10 +2444,9 @@
           <a:lstStyle/>
           <a:p>
             <a:r>
-              <a:rPr lang="en-US" smtClean="0"/>
+              <a:rPr lang="en-US"/>
               <a:t>Click to edit Master title style</a:t>
             </a:r>
-            <a:endParaRPr lang="en-US"/>
           </a:p>
         </p:txBody>
       </p:sp>
@@ -2496,38 +2477,37 @@
           <a:p>
             <a:pPr lvl="0"/>
             <a:r>
-              <a:rPr lang="en-US" smtClean="0"/>
+              <a:rPr lang="en-US"/>
               <a:t>Edit Master text styles</a:t>
             </a:r>
           </a:p>
           <a:p>
             <a:pPr lvl="1"/>
             <a:r>
-              <a:rPr lang="en-US" smtClean="0"/>
+              <a:rPr lang="en-US"/>
               <a:t>Second level</a:t>
             </a:r>
           </a:p>
           <a:p>
             <a:pPr lvl="2"/>
             <a:r>
-              <a:rPr lang="en-US" smtClean="0"/>
+              <a:rPr lang="en-US"/>
               <a:t>Third level</a:t>
             </a:r>
           </a:p>
           <a:p>
             <a:pPr lvl="3"/>
             <a:r>
-              <a:rPr lang="en-US" smtClean="0"/>
+              <a:rPr lang="en-US"/>
               <a:t>Fourth level</a:t>
             </a:r>
           </a:p>
           <a:p>
             <a:pPr lvl="4"/>
             <a:r>
-              <a:rPr lang="en-US" smtClean="0"/>
+              <a:rPr lang="en-US"/>
               <a:t>Fifth level</a:t>
             </a:r>
-            <a:endParaRPr lang="en-US"/>
           </a:p>
         </p:txBody>
       </p:sp>
@@ -3005,7 +2985,7 @@
           <a:bodyPr/>
           <a:lstStyle/>
           <a:p>
-            <a:endParaRPr lang="en-US"/>
+            <a:endParaRPr lang="en-US" dirty="0"/>
           </a:p>
         </p:txBody>
       </p:sp>
@@ -3056,10 +3036,9 @@
           <a:p>
             <a:pPr algn="ctr"/>
             <a:r>
-              <a:rPr lang="en-US" b="1" dirty="0" smtClean="0"/>
+              <a:rPr lang="en-US" b="1" dirty="0"/>
               <a:t>Steps for data extraction and transformation</a:t>
             </a:r>
-            <a:endParaRPr lang="en-US" b="1" dirty="0"/>
           </a:p>
         </p:txBody>
       </p:sp>
@@ -3084,13 +3063,13 @@
               <a:buNone/>
             </a:pPr>
             <a:r>
-              <a:rPr lang="en-US" b="1" dirty="0" smtClean="0"/>
+              <a:rPr lang="en-US" b="1" dirty="0"/>
               <a:t>Data Source:</a:t>
             </a:r>
           </a:p>
           <a:p>
             <a:r>
-              <a:rPr lang="en-US" dirty="0" smtClean="0"/>
+              <a:rPr lang="en-US" dirty="0"/>
               <a:t>Step 1: choose data source</a:t>
             </a:r>
           </a:p>
@@ -3099,19 +3078,19 @@
               <a:buNone/>
             </a:pPr>
             <a:r>
-              <a:rPr lang="en-US" b="1" dirty="0" smtClean="0"/>
+              <a:rPr lang="en-US" b="1" dirty="0"/>
               <a:t>Data extraction:</a:t>
             </a:r>
           </a:p>
           <a:p>
             <a:r>
-              <a:rPr lang="en-US" dirty="0" smtClean="0"/>
+              <a:rPr lang="en-US" dirty="0"/>
               <a:t>Step 2: connect data source to excel</a:t>
             </a:r>
           </a:p>
           <a:p>
             <a:r>
-              <a:rPr lang="en-US" dirty="0" smtClean="0"/>
+              <a:rPr lang="en-US" dirty="0"/>
               <a:t>Step 3: clean the data using excel formulas</a:t>
             </a:r>
           </a:p>
@@ -3120,13 +3099,13 @@
               <a:buNone/>
             </a:pPr>
             <a:r>
-              <a:rPr lang="en-US" b="1" dirty="0" smtClean="0"/>
+              <a:rPr lang="en-US" b="1" dirty="0"/>
               <a:t>Data collection:</a:t>
             </a:r>
           </a:p>
           <a:p>
             <a:r>
-              <a:rPr lang="en-US" dirty="0" smtClean="0"/>
+              <a:rPr lang="en-US" dirty="0"/>
               <a:t>Step 4: append the new data for every one minute</a:t>
             </a:r>
           </a:p>
@@ -3135,7 +3114,7 @@
               <a:buNone/>
             </a:pPr>
             <a:r>
-              <a:rPr lang="en-US" b="1" dirty="0" smtClean="0"/>
+              <a:rPr lang="en-US" b="1" dirty="0"/>
               <a:t>Data computations:</a:t>
             </a:r>
           </a:p>
@@ -3144,7 +3123,7 @@
               <a:buNone/>
             </a:pPr>
             <a:r>
-              <a:rPr lang="en-US" dirty="0" smtClean="0"/>
+              <a:rPr lang="en-US" dirty="0"/>
               <a:t>Step 5: calculate the price change in last 24 hours</a:t>
             </a:r>
           </a:p>
@@ -3153,7 +3132,7 @@
               <a:buNone/>
             </a:pPr>
             <a:r>
-              <a:rPr lang="en-US" b="1" dirty="0" smtClean="0"/>
+              <a:rPr lang="en-US" b="1" dirty="0"/>
               <a:t>Data Aggregations:</a:t>
             </a:r>
           </a:p>
@@ -3162,7 +3141,7 @@
               <a:buNone/>
             </a:pPr>
             <a:r>
-              <a:rPr lang="en-US" dirty="0" smtClean="0"/>
+              <a:rPr lang="en-US" dirty="0"/>
               <a:t>Step 6: calculate the min, max of each company and append.</a:t>
             </a:r>
           </a:p>
@@ -3170,13 +3149,13 @@
             <a:pPr marL="0" indent="0">
               <a:buNone/>
             </a:pPr>
-            <a:endParaRPr lang="en-US" dirty="0" smtClean="0"/>
+            <a:endParaRPr lang="en-US" dirty="0"/>
           </a:p>
           <a:p>
             <a:pPr marL="0" indent="0">
               <a:buNone/>
             </a:pPr>
-            <a:endParaRPr lang="en-US" dirty="0" smtClean="0"/>
+            <a:endParaRPr lang="en-US" dirty="0"/>
           </a:p>
           <a:p>
             <a:endParaRPr lang="en-US" dirty="0"/>
@@ -3230,10 +3209,9 @@
           <a:p>
             <a:pPr algn="ctr"/>
             <a:r>
-              <a:rPr lang="en-US" b="1" dirty="0" smtClean="0"/>
+              <a:rPr lang="en-US" b="1" dirty="0"/>
               <a:t>Steps to visualize data in web</a:t>
             </a:r>
-            <a:endParaRPr lang="en-US" b="1" dirty="0"/>
           </a:p>
         </p:txBody>
       </p:sp>
@@ -3253,16 +3231,8 @@
           <a:lstStyle/>
           <a:p>
             <a:r>
-              <a:rPr lang="en-US" dirty="0" smtClean="0"/>
-              <a:t>Step 1: Execute the below command to run the program in localhost         from the root </a:t>
-            </a:r>
-            <a:r>
               <a:rPr lang="en-US" dirty="0"/>
-              <a:t>directory i.e., </a:t>
-            </a:r>
-            <a:r>
-              <a:rPr lang="en-US" dirty="0" smtClean="0"/>
-              <a:t>“Streaming-Visualization\Web Visualization”</a:t>
+              <a:t>Step 1: Execute the below command to run the program in localhost         from the root directory i.e., “Streaming-Visualization\Web Visualization”</a:t>
             </a:r>
           </a:p>
           <a:p>
@@ -3270,26 +3240,22 @@
               <a:buNone/>
             </a:pPr>
             <a:r>
-              <a:rPr lang="en-US" dirty="0" smtClean="0"/>
-              <a:t> Command</a:t>
-            </a:r>
-            <a:r>
               <a:rPr lang="en-US" dirty="0"/>
-              <a:t>: python -m </a:t>
-            </a:r>
-            <a:r>
-              <a:rPr lang="en-US" dirty="0" err="1" smtClean="0"/>
+              <a:t> Command: python -m </a:t>
+            </a:r>
+            <a:r>
+              <a:rPr lang="en-US" dirty="0" err="1"/>
               <a:t>SimpleHTTPServer</a:t>
             </a:r>
             <a:endParaRPr lang="en-US" dirty="0"/>
           </a:p>
           <a:p>
             <a:r>
-              <a:rPr lang="en-US" dirty="0" smtClean="0"/>
+              <a:rPr lang="en-US" dirty="0"/>
               <a:t>Step 2: </a:t>
             </a:r>
             <a:r>
-              <a:rPr lang="en-US" dirty="0" err="1" smtClean="0"/>
+              <a:rPr lang="en-US" dirty="0" err="1"/>
               <a:t>Goto</a:t>
             </a:r>
             <a:r>
@@ -3300,22 +3266,16 @@
               <a:rPr lang="en-US" dirty="0">
                 <a:hlinkClick r:id="rId2"/>
               </a:rPr>
-              <a:t>http://localhost:8000</a:t>
-            </a:r>
-            <a:r>
-              <a:rPr lang="en-US" dirty="0" smtClean="0">
-                <a:hlinkClick r:id="rId2"/>
-              </a:rPr>
-              <a:t>/</a:t>
-            </a:r>
-            <a:r>
-              <a:rPr lang="en-US" dirty="0" smtClean="0"/>
+              <a:t>http://localhost:8000/</a:t>
+            </a:r>
+            <a:r>
+              <a:rPr lang="en-US" dirty="0"/>
               <a:t> </a:t>
             </a:r>
           </a:p>
           <a:p>
             <a:r>
-              <a:rPr lang="en-US" dirty="0" smtClean="0"/>
+              <a:rPr lang="en-US" dirty="0"/>
               <a:t>Step 3: Below is the screen displayed in the web page.</a:t>
             </a:r>
           </a:p>
@@ -3352,6 +3312,133 @@
     <p:extLst>
       <p:ext uri="{BB962C8B-B14F-4D97-AF65-F5344CB8AC3E}">
         <p14:creationId xmlns:p14="http://schemas.microsoft.com/office/powerpoint/2010/main" val="3388896451"/>
+      </p:ext>
+    </p:extLst>
+  </p:cSld>
+  <p:clrMapOvr>
+    <a:masterClrMapping/>
+  </p:clrMapOvr>
+</p:sld>
+</file>
+
+<file path=ppt/slides/slide4.xml><?xml version="1.0" encoding="utf-8"?>
+<p:sld xmlns:a="http://schemas.openxmlformats.org/drawingml/2006/main" xmlns:r="http://schemas.openxmlformats.org/officeDocument/2006/relationships" xmlns:p="http://schemas.openxmlformats.org/presentationml/2006/main">
+  <p:cSld>
+    <p:spTree>
+      <p:nvGrpSpPr>
+        <p:cNvPr id="1" name=""/>
+        <p:cNvGrpSpPr/>
+        <p:nvPr/>
+      </p:nvGrpSpPr>
+      <p:grpSpPr>
+        <a:xfrm>
+          <a:off x="0" y="0"/>
+          <a:ext cx="0" cy="0"/>
+          <a:chOff x="0" y="0"/>
+          <a:chExt cx="0" cy="0"/>
+        </a:xfrm>
+      </p:grpSpPr>
+      <p:sp>
+        <p:nvSpPr>
+          <p:cNvPr id="2" name="Title 1">
+            <a:extLst>
+              <a:ext uri="{FF2B5EF4-FFF2-40B4-BE49-F238E27FC236}">
+                <a16:creationId xmlns:a16="http://schemas.microsoft.com/office/drawing/2014/main" id="{2B1E24B0-E21F-414B-82A0-B5420C4C23D3}"/>
+              </a:ext>
+            </a:extLst>
+          </p:cNvPr>
+          <p:cNvSpPr>
+            <a:spLocks noGrp="1"/>
+          </p:cNvSpPr>
+          <p:nvPr>
+            <p:ph type="title"/>
+          </p:nvPr>
+        </p:nvSpPr>
+        <p:spPr/>
+        <p:txBody>
+          <a:bodyPr/>
+          <a:lstStyle/>
+          <a:p>
+            <a:r>
+              <a:rPr lang="en-US"/>
+              <a:t>		 Visualization Using Tableau</a:t>
+            </a:r>
+          </a:p>
+        </p:txBody>
+      </p:sp>
+      <p:sp>
+        <p:nvSpPr>
+          <p:cNvPr id="3" name="Content Placeholder 2">
+            <a:extLst>
+              <a:ext uri="{FF2B5EF4-FFF2-40B4-BE49-F238E27FC236}">
+                <a16:creationId xmlns:a16="http://schemas.microsoft.com/office/drawing/2014/main" id="{2A38DC88-12BF-4AA0-AB70-4BC37FC187E8}"/>
+              </a:ext>
+            </a:extLst>
+          </p:cNvPr>
+          <p:cNvSpPr>
+            <a:spLocks noGrp="1"/>
+          </p:cNvSpPr>
+          <p:nvPr>
+            <p:ph idx="1"/>
+          </p:nvPr>
+        </p:nvSpPr>
+        <p:spPr/>
+        <p:txBody>
+          <a:bodyPr>
+            <a:normAutofit fontScale="92500" lnSpcReduction="10000"/>
+          </a:bodyPr>
+          <a:lstStyle/>
+          <a:p>
+            <a:r>
+              <a:rPr lang="en-US" dirty="0"/>
+              <a:t>Step 1: Import excel data through the Microsoft excel.</a:t>
+            </a:r>
+          </a:p>
+          <a:p>
+            <a:r>
+              <a:rPr lang="en-US" dirty="0"/>
+              <a:t>Step 2: Drag your corresponding sheet in to the dashboard then you will see the data in the data source.</a:t>
+            </a:r>
+          </a:p>
+          <a:p>
+            <a:r>
+              <a:rPr lang="en-US" dirty="0"/>
+              <a:t>Step 3: Create a parameter by right clicking in the tableau.</a:t>
+            </a:r>
+          </a:p>
+          <a:p>
+            <a:r>
+              <a:rPr lang="en-US" dirty="0"/>
+              <a:t>Step 4: Change the allowable values from all to list.</a:t>
+            </a:r>
+          </a:p>
+          <a:p>
+            <a:r>
+              <a:rPr lang="en-US" dirty="0"/>
+              <a:t>Step 5: Write the crypto currency names according to the data in the Display as column and click on OK.</a:t>
+            </a:r>
+          </a:p>
+          <a:p>
+            <a:r>
+              <a:rPr lang="en-US" dirty="0"/>
+              <a:t>Step 6: Create a calculated field by right clicking in the tableau and write some code.</a:t>
+            </a:r>
+          </a:p>
+          <a:p>
+            <a:r>
+              <a:rPr lang="en-US" dirty="0"/>
+              <a:t>Step 7: Insert time in the columns row and parameter in the rows and select line graph in the marks.</a:t>
+            </a:r>
+          </a:p>
+          <a:p>
+            <a:endParaRPr lang="en-US" dirty="0"/>
+          </a:p>
+        </p:txBody>
+      </p:sp>
+    </p:spTree>
+    <p:extLst>
+      <p:ext uri="{BB962C8B-B14F-4D97-AF65-F5344CB8AC3E}">
+        <p14:creationId xmlns:p14="http://schemas.microsoft.com/office/powerpoint/2010/main" val="73834128"/>
       </p:ext>
     </p:extLst>
   </p:cSld>

</xml_diff>

<commit_message>
Video_PPT.pptx has been updated for web visualization
</commit_message>
<xml_diff>
--- a/Video_PPT.pptx
+++ b/Video_PPT.pptx
@@ -3227,12 +3227,66 @@
         </p:nvSpPr>
         <p:spPr/>
         <p:txBody>
-          <a:bodyPr/>
-          <a:lstStyle/>
-          <a:p>
+          <a:bodyPr>
+            <a:normAutofit fontScale="92500" lnSpcReduction="10000"/>
+          </a:bodyPr>
+          <a:lstStyle/>
+          <a:p>
+            <a:r>
+              <a:rPr lang="en-US" dirty="0" smtClean="0"/>
+              <a:t>Step 1: Using VBScript code convert macro enabled excel file to .csv format for the sheet “</a:t>
+            </a:r>
+            <a:r>
+              <a:rPr lang="en-US" dirty="0" err="1"/>
+              <a:t>CleanedData</a:t>
+            </a:r>
+            <a:r>
+              <a:rPr lang="en-US" dirty="0" smtClean="0"/>
+              <a:t>”.</a:t>
+            </a:r>
+          </a:p>
+          <a:p>
+            <a:r>
+              <a:rPr lang="en-US" dirty="0" smtClean="0"/>
+              <a:t>Step 2: Extract the CleanedData.csv file data using papa parse library.</a:t>
+            </a:r>
+          </a:p>
+          <a:p>
+            <a:r>
+              <a:rPr lang="en-US" dirty="0" smtClean="0"/>
+              <a:t>Step 3: Push the CleanedData.csv data to the respective arrays.</a:t>
+            </a:r>
+          </a:p>
+          <a:p>
+            <a:r>
+              <a:rPr lang="en-US" dirty="0" smtClean="0"/>
+              <a:t>Step 4: Generate line chart using C3 library by mentioning time as X-axis and </a:t>
+            </a:r>
+            <a:r>
+              <a:rPr lang="en-US" dirty="0" err="1" smtClean="0"/>
+              <a:t>cryptos</a:t>
+            </a:r>
+            <a:r>
+              <a:rPr lang="en-US" dirty="0" smtClean="0"/>
+              <a:t> and stocks as  Y-axis.</a:t>
+            </a:r>
+          </a:p>
+          <a:p>
+            <a:r>
+              <a:rPr lang="en-US" dirty="0" smtClean="0"/>
+              <a:t>Step </a:t>
+            </a:r>
             <a:r>
               <a:rPr lang="en-US" dirty="0"/>
-              <a:t>Step 1: Execute the below command to run the program in localhost         from the root directory i.e., “Streaming-Visualization\Web Visualization”</a:t>
+              <a:t>5</a:t>
+            </a:r>
+            <a:r>
+              <a:rPr lang="en-US" dirty="0" smtClean="0"/>
+              <a:t>: </a:t>
+            </a:r>
+            <a:r>
+              <a:rPr lang="en-US" dirty="0"/>
+              <a:t>Execute the below command to run the program in localhost         from the root directory i.e., “Streaming-Visualization\Web Visualization”</a:t>
             </a:r>
           </a:p>
           <a:p>
@@ -3252,7 +3306,15 @@
           <a:p>
             <a:r>
               <a:rPr lang="en-US" dirty="0"/>
-              <a:t>Step 2: </a:t>
+              <a:t>Step </a:t>
+            </a:r>
+            <a:r>
+              <a:rPr lang="en-US" dirty="0"/>
+              <a:t>6</a:t>
+            </a:r>
+            <a:r>
+              <a:rPr lang="en-US" dirty="0" smtClean="0"/>
+              <a:t>: </a:t>
             </a:r>
             <a:r>
               <a:rPr lang="en-US" dirty="0" err="1"/>
@@ -3272,42 +3334,18 @@
               <a:rPr lang="en-US" dirty="0"/>
               <a:t> </a:t>
             </a:r>
-          </a:p>
-          <a:p>
-            <a:r>
-              <a:rPr lang="en-US" dirty="0"/>
-              <a:t>Step 3: Below is the screen displayed in the web page.</a:t>
-            </a:r>
-          </a:p>
-          <a:p>
+            <a:r>
+              <a:rPr lang="en-US" dirty="0" smtClean="0"/>
+              <a:t>to see the line chart for the </a:t>
+            </a:r>
+            <a:r>
+              <a:rPr lang="en-US" smtClean="0"/>
+              <a:t>source data.</a:t>
+            </a:r>
             <a:endParaRPr lang="en-US" dirty="0"/>
           </a:p>
         </p:txBody>
       </p:sp>
-      <p:pic>
-        <p:nvPicPr>
-          <p:cNvPr id="4" name="Picture 3"/>
-          <p:cNvPicPr>
-            <a:picLocks noChangeAspect="1"/>
-          </p:cNvPicPr>
-          <p:nvPr/>
-        </p:nvPicPr>
-        <p:blipFill>
-          <a:blip r:embed="rId3"/>
-          <a:stretch>
-            <a:fillRect/>
-          </a:stretch>
-        </p:blipFill>
-        <p:spPr>
-          <a:xfrm>
-            <a:off x="2346415" y="4414429"/>
-            <a:ext cx="5726431" cy="2443571"/>
-          </a:xfrm>
-          <a:prstGeom prst="rect">
-            <a:avLst/>
-          </a:prstGeom>
-        </p:spPr>
-      </p:pic>
     </p:spTree>
     <p:extLst>
       <p:ext uri="{BB962C8B-B14F-4D97-AF65-F5344CB8AC3E}">

</xml_diff>